<commit_message>
change some database files
</commit_message>
<xml_diff>
--- a/Documentation/Slides/EClient 2nd slide middle proposal defense eclinetv1.2.pptx
+++ b/Documentation/Slides/EClient 2nd slide middle proposal defense eclinetv1.2.pptx
@@ -258,7 +258,7 @@
           <a:p>
             <a:fld id="{98BFAF85-09EF-1B4D-A920-76863D981E4E}" type="datetimeFigureOut">
               <a:rPr lang="en-US" smtClean="0"/>
-              <a:t>05/07/2018</a:t>
+              <a:t>09/07/2018</a:t>
             </a:fld>
             <a:endParaRPr lang="en-US"/>
           </a:p>
@@ -426,7 +426,7 @@
           <a:p>
             <a:fld id="{98BFAF85-09EF-1B4D-A920-76863D981E4E}" type="datetimeFigureOut">
               <a:rPr lang="en-US" smtClean="0"/>
-              <a:t>05/07/2018</a:t>
+              <a:t>09/07/2018</a:t>
             </a:fld>
             <a:endParaRPr lang="en-US"/>
           </a:p>
@@ -604,7 +604,7 @@
           <a:p>
             <a:fld id="{98BFAF85-09EF-1B4D-A920-76863D981E4E}" type="datetimeFigureOut">
               <a:rPr lang="en-US" smtClean="0"/>
-              <a:t>05/07/2018</a:t>
+              <a:t>09/07/2018</a:t>
             </a:fld>
             <a:endParaRPr lang="en-US"/>
           </a:p>
@@ -772,7 +772,7 @@
           <a:p>
             <a:fld id="{98BFAF85-09EF-1B4D-A920-76863D981E4E}" type="datetimeFigureOut">
               <a:rPr lang="en-US" smtClean="0"/>
-              <a:t>05/07/2018</a:t>
+              <a:t>09/07/2018</a:t>
             </a:fld>
             <a:endParaRPr lang="en-US"/>
           </a:p>
@@ -1017,7 +1017,7 @@
           <a:p>
             <a:fld id="{98BFAF85-09EF-1B4D-A920-76863D981E4E}" type="datetimeFigureOut">
               <a:rPr lang="en-US" smtClean="0"/>
-              <a:t>05/07/2018</a:t>
+              <a:t>09/07/2018</a:t>
             </a:fld>
             <a:endParaRPr lang="en-US"/>
           </a:p>
@@ -1246,7 +1246,7 @@
           <a:p>
             <a:fld id="{98BFAF85-09EF-1B4D-A920-76863D981E4E}" type="datetimeFigureOut">
               <a:rPr lang="en-US" smtClean="0"/>
-              <a:t>05/07/2018</a:t>
+              <a:t>09/07/2018</a:t>
             </a:fld>
             <a:endParaRPr lang="en-US"/>
           </a:p>
@@ -1610,7 +1610,7 @@
           <a:p>
             <a:fld id="{98BFAF85-09EF-1B4D-A920-76863D981E4E}" type="datetimeFigureOut">
               <a:rPr lang="en-US" smtClean="0"/>
-              <a:t>05/07/2018</a:t>
+              <a:t>09/07/2018</a:t>
             </a:fld>
             <a:endParaRPr lang="en-US"/>
           </a:p>
@@ -1727,7 +1727,7 @@
           <a:p>
             <a:fld id="{98BFAF85-09EF-1B4D-A920-76863D981E4E}" type="datetimeFigureOut">
               <a:rPr lang="en-US" smtClean="0"/>
-              <a:t>05/07/2018</a:t>
+              <a:t>09/07/2018</a:t>
             </a:fld>
             <a:endParaRPr lang="en-US"/>
           </a:p>
@@ -1822,7 +1822,7 @@
           <a:p>
             <a:fld id="{98BFAF85-09EF-1B4D-A920-76863D981E4E}" type="datetimeFigureOut">
               <a:rPr lang="en-US" smtClean="0"/>
-              <a:t>05/07/2018</a:t>
+              <a:t>09/07/2018</a:t>
             </a:fld>
             <a:endParaRPr lang="en-US"/>
           </a:p>
@@ -2097,7 +2097,7 @@
           <a:p>
             <a:fld id="{98BFAF85-09EF-1B4D-A920-76863D981E4E}" type="datetimeFigureOut">
               <a:rPr lang="en-US" smtClean="0"/>
-              <a:t>05/07/2018</a:t>
+              <a:t>09/07/2018</a:t>
             </a:fld>
             <a:endParaRPr lang="en-US"/>
           </a:p>
@@ -2349,7 +2349,7 @@
           <a:p>
             <a:fld id="{98BFAF85-09EF-1B4D-A920-76863D981E4E}" type="datetimeFigureOut">
               <a:rPr lang="en-US" smtClean="0"/>
-              <a:t>05/07/2018</a:t>
+              <a:t>09/07/2018</a:t>
             </a:fld>
             <a:endParaRPr lang="en-US"/>
           </a:p>
@@ -2563,7 +2563,7 @@
           <a:p>
             <a:fld id="{98BFAF85-09EF-1B4D-A920-76863D981E4E}" type="datetimeFigureOut">
               <a:rPr lang="en-US" smtClean="0"/>
-              <a:t>05/07/2018</a:t>
+              <a:t>09/07/2018</a:t>
             </a:fld>
             <a:endParaRPr lang="en-US"/>
           </a:p>
@@ -2973,7 +2973,7 @@
           <p:cNvPr id="4" name="TextBox 3">
             <a:extLst>
               <a:ext uri="{FF2B5EF4-FFF2-40B4-BE49-F238E27FC236}">
-                <a16:creationId xmlns:a16="http://schemas.microsoft.com/office/drawing/2014/main" xmlns="" id="{9EB0FD16-689C-476C-8309-C7173C257513}"/>
+                <a16:creationId xmlns="" xmlns:a16="http://schemas.microsoft.com/office/drawing/2014/main" id="{9EB0FD16-689C-476C-8309-C7173C257513}"/>
               </a:ext>
             </a:extLst>
           </p:cNvPr>
@@ -3014,7 +3014,7 @@
           <p:cNvPr id="5" name="TextBox 4">
             <a:extLst>
               <a:ext uri="{FF2B5EF4-FFF2-40B4-BE49-F238E27FC236}">
-                <a16:creationId xmlns:a16="http://schemas.microsoft.com/office/drawing/2014/main" xmlns="" id="{4F202974-31A3-4642-B671-F0DBBB7B4663}"/>
+                <a16:creationId xmlns="" xmlns:a16="http://schemas.microsoft.com/office/drawing/2014/main" id="{4F202974-31A3-4642-B671-F0DBBB7B4663}"/>
               </a:ext>
             </a:extLst>
           </p:cNvPr>
@@ -3067,7 +3067,7 @@
           <p:cNvPr id="7" name="TextBox 6">
             <a:extLst>
               <a:ext uri="{FF2B5EF4-FFF2-40B4-BE49-F238E27FC236}">
-                <a16:creationId xmlns:a16="http://schemas.microsoft.com/office/drawing/2014/main" xmlns="" id="{4F202974-31A3-4642-B671-F0DBBB7B4663}"/>
+                <a16:creationId xmlns="" xmlns:a16="http://schemas.microsoft.com/office/drawing/2014/main" id="{4F202974-31A3-4642-B671-F0DBBB7B4663}"/>
               </a:ext>
             </a:extLst>
           </p:cNvPr>
@@ -3144,7 +3144,7 @@
           <p:cNvPr id="9" name="TextBox 8">
             <a:extLst>
               <a:ext uri="{FF2B5EF4-FFF2-40B4-BE49-F238E27FC236}">
-                <a16:creationId xmlns:a16="http://schemas.microsoft.com/office/drawing/2014/main" xmlns="" id="{4F202974-31A3-4642-B671-F0DBBB7B4663}"/>
+                <a16:creationId xmlns="" xmlns:a16="http://schemas.microsoft.com/office/drawing/2014/main" id="{4F202974-31A3-4642-B671-F0DBBB7B4663}"/>
               </a:ext>
             </a:extLst>
           </p:cNvPr>
@@ -3188,7 +3188,7 @@
           <p:cNvPr id="11" name="TextBox 10">
             <a:extLst>
               <a:ext uri="{FF2B5EF4-FFF2-40B4-BE49-F238E27FC236}">
-                <a16:creationId xmlns:a16="http://schemas.microsoft.com/office/drawing/2014/main" xmlns="" id="{79BCE1F0-A71E-4D4B-BE6A-A381604C28D2}"/>
+                <a16:creationId xmlns="" xmlns:a16="http://schemas.microsoft.com/office/drawing/2014/main" id="{79BCE1F0-A71E-4D4B-BE6A-A381604C28D2}"/>
               </a:ext>
             </a:extLst>
           </p:cNvPr>
@@ -3994,7 +3994,7 @@
           <p:cNvPr id="5" name="TextBox 4">
             <a:extLst>
               <a:ext uri="{FF2B5EF4-FFF2-40B4-BE49-F238E27FC236}">
-                <a16:creationId xmlns:a16="http://schemas.microsoft.com/office/drawing/2014/main" xmlns="" id="{A94C4F95-2EDE-46B0-8B26-C72D6D3C8DB3}"/>
+                <a16:creationId xmlns="" xmlns:a16="http://schemas.microsoft.com/office/drawing/2014/main" id="{A94C4F95-2EDE-46B0-8B26-C72D6D3C8DB3}"/>
               </a:ext>
             </a:extLst>
           </p:cNvPr>
@@ -4035,7 +4035,7 @@
           <p:cNvPr id="6" name="TextBox 5">
             <a:extLst>
               <a:ext uri="{FF2B5EF4-FFF2-40B4-BE49-F238E27FC236}">
-                <a16:creationId xmlns:a16="http://schemas.microsoft.com/office/drawing/2014/main" xmlns="" id="{D8562F22-E78F-4DD5-9BBD-EEAB69C0B365}"/>
+                <a16:creationId xmlns="" xmlns:a16="http://schemas.microsoft.com/office/drawing/2014/main" id="{D8562F22-E78F-4DD5-9BBD-EEAB69C0B365}"/>
               </a:ext>
             </a:extLst>
           </p:cNvPr>
@@ -4119,7 +4119,7 @@
           <p:cNvPr id="10" name="TextBox 9">
             <a:extLst>
               <a:ext uri="{FF2B5EF4-FFF2-40B4-BE49-F238E27FC236}">
-                <a16:creationId xmlns:a16="http://schemas.microsoft.com/office/drawing/2014/main" xmlns="" id="{D8562F22-E78F-4DD5-9BBD-EEAB69C0B365}"/>
+                <a16:creationId xmlns="" xmlns:a16="http://schemas.microsoft.com/office/drawing/2014/main" id="{D8562F22-E78F-4DD5-9BBD-EEAB69C0B365}"/>
               </a:ext>
             </a:extLst>
           </p:cNvPr>
@@ -4160,7 +4160,7 @@
           <p:cNvPr id="7" name="TextBox 6">
             <a:extLst>
               <a:ext uri="{FF2B5EF4-FFF2-40B4-BE49-F238E27FC236}">
-                <a16:creationId xmlns:a16="http://schemas.microsoft.com/office/drawing/2014/main" xmlns="" id="{D8562F22-E78F-4DD5-9BBD-EEAB69C0B365}"/>
+                <a16:creationId xmlns="" xmlns:a16="http://schemas.microsoft.com/office/drawing/2014/main" id="{D8562F22-E78F-4DD5-9BBD-EEAB69C0B365}"/>
               </a:ext>
             </a:extLst>
           </p:cNvPr>
@@ -4717,7 +4717,7 @@
           <p:cNvPr id="5" name="TextBox 4">
             <a:extLst>
               <a:ext uri="{FF2B5EF4-FFF2-40B4-BE49-F238E27FC236}">
-                <a16:creationId xmlns:a16="http://schemas.microsoft.com/office/drawing/2014/main" xmlns="" id="{A94C4F95-2EDE-46B0-8B26-C72D6D3C8DB3}"/>
+                <a16:creationId xmlns="" xmlns:a16="http://schemas.microsoft.com/office/drawing/2014/main" id="{A94C4F95-2EDE-46B0-8B26-C72D6D3C8DB3}"/>
               </a:ext>
             </a:extLst>
           </p:cNvPr>
@@ -4758,7 +4758,7 @@
           <p:cNvPr id="6" name="TextBox 5">
             <a:extLst>
               <a:ext uri="{FF2B5EF4-FFF2-40B4-BE49-F238E27FC236}">
-                <a16:creationId xmlns:a16="http://schemas.microsoft.com/office/drawing/2014/main" xmlns="" id="{D8562F22-E78F-4DD5-9BBD-EEAB69C0B365}"/>
+                <a16:creationId xmlns="" xmlns:a16="http://schemas.microsoft.com/office/drawing/2014/main" id="{D8562F22-E78F-4DD5-9BBD-EEAB69C0B365}"/>
               </a:ext>
             </a:extLst>
           </p:cNvPr>
@@ -4798,7 +4798,7 @@
           <p:cNvPr id="12" name="TextBox 11">
             <a:extLst>
               <a:ext uri="{FF2B5EF4-FFF2-40B4-BE49-F238E27FC236}">
-                <a16:creationId xmlns:a16="http://schemas.microsoft.com/office/drawing/2014/main" xmlns="" id="{D8562F22-E78F-4DD5-9BBD-EEAB69C0B365}"/>
+                <a16:creationId xmlns="" xmlns:a16="http://schemas.microsoft.com/office/drawing/2014/main" id="{D8562F22-E78F-4DD5-9BBD-EEAB69C0B365}"/>
               </a:ext>
             </a:extLst>
           </p:cNvPr>
@@ -4839,7 +4839,7 @@
           <p:cNvPr id="7" name="TextBox 6">
             <a:extLst>
               <a:ext uri="{FF2B5EF4-FFF2-40B4-BE49-F238E27FC236}">
-                <a16:creationId xmlns:a16="http://schemas.microsoft.com/office/drawing/2014/main" xmlns="" id="{D8562F22-E78F-4DD5-9BBD-EEAB69C0B365}"/>
+                <a16:creationId xmlns="" xmlns:a16="http://schemas.microsoft.com/office/drawing/2014/main" id="{D8562F22-E78F-4DD5-9BBD-EEAB69C0B365}"/>
               </a:ext>
             </a:extLst>
           </p:cNvPr>
@@ -4989,7 +4989,7 @@
           <p:cNvPr id="3" name="Picture 2">
             <a:extLst>
               <a:ext uri="{FF2B5EF4-FFF2-40B4-BE49-F238E27FC236}">
-                <a16:creationId xmlns:a16="http://schemas.microsoft.com/office/drawing/2014/main" xmlns="" id="{F3ADC7AB-1D42-4345-BC5E-B01399F2B27B}"/>
+                <a16:creationId xmlns="" xmlns:a16="http://schemas.microsoft.com/office/drawing/2014/main" id="{F3ADC7AB-1D42-4345-BC5E-B01399F2B27B}"/>
               </a:ext>
             </a:extLst>
           </p:cNvPr>
@@ -5442,7 +5442,7 @@
           <p:cNvPr id="7" name="TextBox 6">
             <a:extLst>
               <a:ext uri="{FF2B5EF4-FFF2-40B4-BE49-F238E27FC236}">
-                <a16:creationId xmlns:a16="http://schemas.microsoft.com/office/drawing/2014/main" xmlns="" id="{A94C4F95-2EDE-46B0-8B26-C72D6D3C8DB3}"/>
+                <a16:creationId xmlns="" xmlns:a16="http://schemas.microsoft.com/office/drawing/2014/main" id="{A94C4F95-2EDE-46B0-8B26-C72D6D3C8DB3}"/>
               </a:ext>
             </a:extLst>
           </p:cNvPr>
@@ -5483,7 +5483,7 @@
           <p:cNvPr id="8" name="TextBox 7">
             <a:extLst>
               <a:ext uri="{FF2B5EF4-FFF2-40B4-BE49-F238E27FC236}">
-                <a16:creationId xmlns:a16="http://schemas.microsoft.com/office/drawing/2014/main" xmlns="" id="{D8562F22-E78F-4DD5-9BBD-EEAB69C0B365}"/>
+                <a16:creationId xmlns="" xmlns:a16="http://schemas.microsoft.com/office/drawing/2014/main" id="{D8562F22-E78F-4DD5-9BBD-EEAB69C0B365}"/>
               </a:ext>
             </a:extLst>
           </p:cNvPr>
@@ -5523,7 +5523,7 @@
           <p:cNvPr id="9" name="TextBox 8">
             <a:extLst>
               <a:ext uri="{FF2B5EF4-FFF2-40B4-BE49-F238E27FC236}">
-                <a16:creationId xmlns:a16="http://schemas.microsoft.com/office/drawing/2014/main" xmlns="" id="{D8562F22-E78F-4DD5-9BBD-EEAB69C0B365}"/>
+                <a16:creationId xmlns="" xmlns:a16="http://schemas.microsoft.com/office/drawing/2014/main" id="{D8562F22-E78F-4DD5-9BBD-EEAB69C0B365}"/>
               </a:ext>
             </a:extLst>
           </p:cNvPr>
@@ -5564,7 +5564,7 @@
           <p:cNvPr id="10" name="TextBox 9">
             <a:extLst>
               <a:ext uri="{FF2B5EF4-FFF2-40B4-BE49-F238E27FC236}">
-                <a16:creationId xmlns:a16="http://schemas.microsoft.com/office/drawing/2014/main" xmlns="" id="{D8562F22-E78F-4DD5-9BBD-EEAB69C0B365}"/>
+                <a16:creationId xmlns="" xmlns:a16="http://schemas.microsoft.com/office/drawing/2014/main" id="{D8562F22-E78F-4DD5-9BBD-EEAB69C0B365}"/>
               </a:ext>
             </a:extLst>
           </p:cNvPr>
@@ -5748,7 +5748,7 @@
           <p:cNvPr id="11" name="TextBox 10">
             <a:extLst>
               <a:ext uri="{FF2B5EF4-FFF2-40B4-BE49-F238E27FC236}">
-                <a16:creationId xmlns:a16="http://schemas.microsoft.com/office/drawing/2014/main" xmlns="" id="{D8562F22-E78F-4DD5-9BBD-EEAB69C0B365}"/>
+                <a16:creationId xmlns="" xmlns:a16="http://schemas.microsoft.com/office/drawing/2014/main" id="{D8562F22-E78F-4DD5-9BBD-EEAB69C0B365}"/>
               </a:ext>
             </a:extLst>
           </p:cNvPr>
@@ -6306,7 +6306,7 @@
           <p:cNvPr id="5" name="TextBox 4">
             <a:extLst>
               <a:ext uri="{FF2B5EF4-FFF2-40B4-BE49-F238E27FC236}">
-                <a16:creationId xmlns:a16="http://schemas.microsoft.com/office/drawing/2014/main" xmlns="" id="{A94C4F95-2EDE-46B0-8B26-C72D6D3C8DB3}"/>
+                <a16:creationId xmlns="" xmlns:a16="http://schemas.microsoft.com/office/drawing/2014/main" id="{A94C4F95-2EDE-46B0-8B26-C72D6D3C8DB3}"/>
               </a:ext>
             </a:extLst>
           </p:cNvPr>
@@ -6347,7 +6347,7 @@
           <p:cNvPr id="6" name="TextBox 5">
             <a:extLst>
               <a:ext uri="{FF2B5EF4-FFF2-40B4-BE49-F238E27FC236}">
-                <a16:creationId xmlns:a16="http://schemas.microsoft.com/office/drawing/2014/main" xmlns="" id="{D8562F22-E78F-4DD5-9BBD-EEAB69C0B365}"/>
+                <a16:creationId xmlns="" xmlns:a16="http://schemas.microsoft.com/office/drawing/2014/main" id="{D8562F22-E78F-4DD5-9BBD-EEAB69C0B365}"/>
               </a:ext>
             </a:extLst>
           </p:cNvPr>
@@ -6477,7 +6477,7 @@
           <p:cNvPr id="9" name="TextBox 8">
             <a:extLst>
               <a:ext uri="{FF2B5EF4-FFF2-40B4-BE49-F238E27FC236}">
-                <a16:creationId xmlns:a16="http://schemas.microsoft.com/office/drawing/2014/main" xmlns="" id="{D8562F22-E78F-4DD5-9BBD-EEAB69C0B365}"/>
+                <a16:creationId xmlns="" xmlns:a16="http://schemas.microsoft.com/office/drawing/2014/main" id="{D8562F22-E78F-4DD5-9BBD-EEAB69C0B365}"/>
               </a:ext>
             </a:extLst>
           </p:cNvPr>
@@ -7033,7 +7033,7 @@
           <p:cNvPr id="5" name="TextBox 4">
             <a:extLst>
               <a:ext uri="{FF2B5EF4-FFF2-40B4-BE49-F238E27FC236}">
-                <a16:creationId xmlns:a16="http://schemas.microsoft.com/office/drawing/2014/main" xmlns="" id="{A94C4F95-2EDE-46B0-8B26-C72D6D3C8DB3}"/>
+                <a16:creationId xmlns="" xmlns:a16="http://schemas.microsoft.com/office/drawing/2014/main" id="{A94C4F95-2EDE-46B0-8B26-C72D6D3C8DB3}"/>
               </a:ext>
             </a:extLst>
           </p:cNvPr>
@@ -7074,7 +7074,7 @@
           <p:cNvPr id="6" name="TextBox 5">
             <a:extLst>
               <a:ext uri="{FF2B5EF4-FFF2-40B4-BE49-F238E27FC236}">
-                <a16:creationId xmlns:a16="http://schemas.microsoft.com/office/drawing/2014/main" xmlns="" id="{D8562F22-E78F-4DD5-9BBD-EEAB69C0B365}"/>
+                <a16:creationId xmlns="" xmlns:a16="http://schemas.microsoft.com/office/drawing/2014/main" id="{D8562F22-E78F-4DD5-9BBD-EEAB69C0B365}"/>
               </a:ext>
             </a:extLst>
           </p:cNvPr>
@@ -7206,7 +7206,7 @@
           <p:cNvPr id="8" name="TextBox 7">
             <a:extLst>
               <a:ext uri="{FF2B5EF4-FFF2-40B4-BE49-F238E27FC236}">
-                <a16:creationId xmlns:a16="http://schemas.microsoft.com/office/drawing/2014/main" xmlns="" id="{D8562F22-E78F-4DD5-9BBD-EEAB69C0B365}"/>
+                <a16:creationId xmlns="" xmlns:a16="http://schemas.microsoft.com/office/drawing/2014/main" id="{D8562F22-E78F-4DD5-9BBD-EEAB69C0B365}"/>
               </a:ext>
             </a:extLst>
           </p:cNvPr>
@@ -7762,7 +7762,7 @@
           <p:cNvPr id="5" name="TextBox 4">
             <a:extLst>
               <a:ext uri="{FF2B5EF4-FFF2-40B4-BE49-F238E27FC236}">
-                <a16:creationId xmlns:a16="http://schemas.microsoft.com/office/drawing/2014/main" xmlns="" id="{A94C4F95-2EDE-46B0-8B26-C72D6D3C8DB3}"/>
+                <a16:creationId xmlns="" xmlns:a16="http://schemas.microsoft.com/office/drawing/2014/main" id="{A94C4F95-2EDE-46B0-8B26-C72D6D3C8DB3}"/>
               </a:ext>
             </a:extLst>
           </p:cNvPr>
@@ -7803,7 +7803,7 @@
           <p:cNvPr id="6" name="TextBox 5">
             <a:extLst>
               <a:ext uri="{FF2B5EF4-FFF2-40B4-BE49-F238E27FC236}">
-                <a16:creationId xmlns:a16="http://schemas.microsoft.com/office/drawing/2014/main" xmlns="" id="{D8562F22-E78F-4DD5-9BBD-EEAB69C0B365}"/>
+                <a16:creationId xmlns="" xmlns:a16="http://schemas.microsoft.com/office/drawing/2014/main" id="{D8562F22-E78F-4DD5-9BBD-EEAB69C0B365}"/>
               </a:ext>
             </a:extLst>
           </p:cNvPr>
@@ -7935,7 +7935,7 @@
           <p:cNvPr id="9" name="TextBox 8">
             <a:extLst>
               <a:ext uri="{FF2B5EF4-FFF2-40B4-BE49-F238E27FC236}">
-                <a16:creationId xmlns:a16="http://schemas.microsoft.com/office/drawing/2014/main" xmlns="" id="{D8562F22-E78F-4DD5-9BBD-EEAB69C0B365}"/>
+                <a16:creationId xmlns="" xmlns:a16="http://schemas.microsoft.com/office/drawing/2014/main" id="{D8562F22-E78F-4DD5-9BBD-EEAB69C0B365}"/>
               </a:ext>
             </a:extLst>
           </p:cNvPr>
@@ -8491,7 +8491,7 @@
           <p:cNvPr id="5" name="TextBox 4">
             <a:extLst>
               <a:ext uri="{FF2B5EF4-FFF2-40B4-BE49-F238E27FC236}">
-                <a16:creationId xmlns:a16="http://schemas.microsoft.com/office/drawing/2014/main" xmlns="" id="{A94C4F95-2EDE-46B0-8B26-C72D6D3C8DB3}"/>
+                <a16:creationId xmlns="" xmlns:a16="http://schemas.microsoft.com/office/drawing/2014/main" id="{A94C4F95-2EDE-46B0-8B26-C72D6D3C8DB3}"/>
               </a:ext>
             </a:extLst>
           </p:cNvPr>
@@ -8532,7 +8532,7 @@
           <p:cNvPr id="6" name="TextBox 5">
             <a:extLst>
               <a:ext uri="{FF2B5EF4-FFF2-40B4-BE49-F238E27FC236}">
-                <a16:creationId xmlns:a16="http://schemas.microsoft.com/office/drawing/2014/main" xmlns="" id="{D8562F22-E78F-4DD5-9BBD-EEAB69C0B365}"/>
+                <a16:creationId xmlns="" xmlns:a16="http://schemas.microsoft.com/office/drawing/2014/main" id="{D8562F22-E78F-4DD5-9BBD-EEAB69C0B365}"/>
               </a:ext>
             </a:extLst>
           </p:cNvPr>
@@ -8632,7 +8632,7 @@
           <p:cNvPr id="8" name="TextBox 7">
             <a:extLst>
               <a:ext uri="{FF2B5EF4-FFF2-40B4-BE49-F238E27FC236}">
-                <a16:creationId xmlns:a16="http://schemas.microsoft.com/office/drawing/2014/main" xmlns="" id="{D8562F22-E78F-4DD5-9BBD-EEAB69C0B365}"/>
+                <a16:creationId xmlns="" xmlns:a16="http://schemas.microsoft.com/office/drawing/2014/main" id="{D8562F22-E78F-4DD5-9BBD-EEAB69C0B365}"/>
               </a:ext>
             </a:extLst>
           </p:cNvPr>
@@ -9107,7 +9107,7 @@
           <p:cNvPr id="5" name="TextBox 4">
             <a:extLst>
               <a:ext uri="{FF2B5EF4-FFF2-40B4-BE49-F238E27FC236}">
-                <a16:creationId xmlns:a16="http://schemas.microsoft.com/office/drawing/2014/main" xmlns="" id="{D8562F22-E78F-4DD5-9BBD-EEAB69C0B365}"/>
+                <a16:creationId xmlns="" xmlns:a16="http://schemas.microsoft.com/office/drawing/2014/main" id="{D8562F22-E78F-4DD5-9BBD-EEAB69C0B365}"/>
               </a:ext>
             </a:extLst>
           </p:cNvPr>
@@ -9258,7 +9258,7 @@
           <p:cNvPr id="7" name="TextBox 6">
             <a:extLst>
               <a:ext uri="{FF2B5EF4-FFF2-40B4-BE49-F238E27FC236}">
-                <a16:creationId xmlns:a16="http://schemas.microsoft.com/office/drawing/2014/main" xmlns="" id="{D8562F22-E78F-4DD5-9BBD-EEAB69C0B365}"/>
+                <a16:creationId xmlns="" xmlns:a16="http://schemas.microsoft.com/office/drawing/2014/main" id="{D8562F22-E78F-4DD5-9BBD-EEAB69C0B365}"/>
               </a:ext>
             </a:extLst>
           </p:cNvPr>
@@ -9313,7 +9313,7 @@
           <p:cNvPr id="6" name="TextBox 5">
             <a:extLst>
               <a:ext uri="{FF2B5EF4-FFF2-40B4-BE49-F238E27FC236}">
-                <a16:creationId xmlns:a16="http://schemas.microsoft.com/office/drawing/2014/main" xmlns="" id="{D8562F22-E78F-4DD5-9BBD-EEAB69C0B365}"/>
+                <a16:creationId xmlns="" xmlns:a16="http://schemas.microsoft.com/office/drawing/2014/main" id="{D8562F22-E78F-4DD5-9BBD-EEAB69C0B365}"/>
               </a:ext>
             </a:extLst>
           </p:cNvPr>
@@ -9707,7 +9707,7 @@
           <p:cNvPr id="4" name="TextBox 3">
             <a:extLst>
               <a:ext uri="{FF2B5EF4-FFF2-40B4-BE49-F238E27FC236}">
-                <a16:creationId xmlns:a16="http://schemas.microsoft.com/office/drawing/2014/main" xmlns="" id="{A94C4F95-2EDE-46B0-8B26-C72D6D3C8DB3}"/>
+                <a16:creationId xmlns="" xmlns:a16="http://schemas.microsoft.com/office/drawing/2014/main" id="{A94C4F95-2EDE-46B0-8B26-C72D6D3C8DB3}"/>
               </a:ext>
             </a:extLst>
           </p:cNvPr>
@@ -9754,7 +9754,7 @@
           <p:cNvPr id="5" name="TextBox 4">
             <a:extLst>
               <a:ext uri="{FF2B5EF4-FFF2-40B4-BE49-F238E27FC236}">
-                <a16:creationId xmlns:a16="http://schemas.microsoft.com/office/drawing/2014/main" xmlns="" id="{A94C4F95-2EDE-46B0-8B26-C72D6D3C8DB3}"/>
+                <a16:creationId xmlns="" xmlns:a16="http://schemas.microsoft.com/office/drawing/2014/main" id="{A94C4F95-2EDE-46B0-8B26-C72D6D3C8DB3}"/>
               </a:ext>
             </a:extLst>
           </p:cNvPr>
@@ -10051,7 +10051,7 @@
           <p:cNvPr id="4" name="Straight Connector 3">
             <a:extLst>
               <a:ext uri="{FF2B5EF4-FFF2-40B4-BE49-F238E27FC236}">
-                <a16:creationId xmlns:a16="http://schemas.microsoft.com/office/drawing/2014/main" xmlns="" id="{7277CEC9-24C9-4B1D-964A-A216786A7724}"/>
+                <a16:creationId xmlns="" xmlns:a16="http://schemas.microsoft.com/office/drawing/2014/main" id="{7277CEC9-24C9-4B1D-964A-A216786A7724}"/>
               </a:ext>
             </a:extLst>
           </p:cNvPr>
@@ -10094,7 +10094,7 @@
           <p:cNvPr id="5" name="Group 4">
             <a:extLst>
               <a:ext uri="{FF2B5EF4-FFF2-40B4-BE49-F238E27FC236}">
-                <a16:creationId xmlns:a16="http://schemas.microsoft.com/office/drawing/2014/main" xmlns="" id="{F1840EDE-DF70-433F-86FE-A402BC5C2DDE}"/>
+                <a16:creationId xmlns="" xmlns:a16="http://schemas.microsoft.com/office/drawing/2014/main" id="{F1840EDE-DF70-433F-86FE-A402BC5C2DDE}"/>
               </a:ext>
             </a:extLst>
           </p:cNvPr>
@@ -10114,7 +10114,7 @@
             <p:cNvPr id="6" name="Oval 5">
               <a:extLst>
                 <a:ext uri="{FF2B5EF4-FFF2-40B4-BE49-F238E27FC236}">
-                  <a16:creationId xmlns:a16="http://schemas.microsoft.com/office/drawing/2014/main" xmlns="" id="{43B84625-CD81-4477-AFEA-2D657FFA16C5}"/>
+                  <a16:creationId xmlns="" xmlns:a16="http://schemas.microsoft.com/office/drawing/2014/main" id="{43B84625-CD81-4477-AFEA-2D657FFA16C5}"/>
                 </a:ext>
               </a:extLst>
             </p:cNvPr>
@@ -10168,7 +10168,7 @@
             <p:cNvPr id="7" name="Oval 6">
               <a:extLst>
                 <a:ext uri="{FF2B5EF4-FFF2-40B4-BE49-F238E27FC236}">
-                  <a16:creationId xmlns:a16="http://schemas.microsoft.com/office/drawing/2014/main" xmlns="" id="{90BB5737-FB23-4CC2-81BC-52D57E7FB8E9}"/>
+                  <a16:creationId xmlns="" xmlns:a16="http://schemas.microsoft.com/office/drawing/2014/main" id="{90BB5737-FB23-4CC2-81BC-52D57E7FB8E9}"/>
                 </a:ext>
               </a:extLst>
             </p:cNvPr>
@@ -10221,7 +10221,7 @@
           <p:cNvPr id="8" name="Straight Connector 7">
             <a:extLst>
               <a:ext uri="{FF2B5EF4-FFF2-40B4-BE49-F238E27FC236}">
-                <a16:creationId xmlns:a16="http://schemas.microsoft.com/office/drawing/2014/main" xmlns="" id="{D5DAD85F-381F-4EA0-9781-3C23F8D9AC73}"/>
+                <a16:creationId xmlns="" xmlns:a16="http://schemas.microsoft.com/office/drawing/2014/main" id="{D5DAD85F-381F-4EA0-9781-3C23F8D9AC73}"/>
               </a:ext>
             </a:extLst>
           </p:cNvPr>
@@ -10264,7 +10264,7 @@
           <p:cNvPr id="9" name="Group 8">
             <a:extLst>
               <a:ext uri="{FF2B5EF4-FFF2-40B4-BE49-F238E27FC236}">
-                <a16:creationId xmlns:a16="http://schemas.microsoft.com/office/drawing/2014/main" xmlns="" id="{E76B67BC-401F-4EA8-8CBE-EEB8DFAA45A7}"/>
+                <a16:creationId xmlns="" xmlns:a16="http://schemas.microsoft.com/office/drawing/2014/main" id="{E76B67BC-401F-4EA8-8CBE-EEB8DFAA45A7}"/>
               </a:ext>
             </a:extLst>
           </p:cNvPr>
@@ -10284,7 +10284,7 @@
             <p:cNvPr id="10" name="Oval 9">
               <a:extLst>
                 <a:ext uri="{FF2B5EF4-FFF2-40B4-BE49-F238E27FC236}">
-                  <a16:creationId xmlns:a16="http://schemas.microsoft.com/office/drawing/2014/main" xmlns="" id="{A399A27A-C7E8-457C-9D90-A66A1BF1F76F}"/>
+                  <a16:creationId xmlns="" xmlns:a16="http://schemas.microsoft.com/office/drawing/2014/main" id="{A399A27A-C7E8-457C-9D90-A66A1BF1F76F}"/>
                 </a:ext>
               </a:extLst>
             </p:cNvPr>
@@ -10338,7 +10338,7 @@
             <p:cNvPr id="11" name="Oval 10">
               <a:extLst>
                 <a:ext uri="{FF2B5EF4-FFF2-40B4-BE49-F238E27FC236}">
-                  <a16:creationId xmlns:a16="http://schemas.microsoft.com/office/drawing/2014/main" xmlns="" id="{C4008114-54A1-42C2-9000-1CC3AE1D8927}"/>
+                  <a16:creationId xmlns="" xmlns:a16="http://schemas.microsoft.com/office/drawing/2014/main" id="{C4008114-54A1-42C2-9000-1CC3AE1D8927}"/>
                 </a:ext>
               </a:extLst>
             </p:cNvPr>
@@ -10391,7 +10391,7 @@
           <p:cNvPr id="12" name="Group 11">
             <a:extLst>
               <a:ext uri="{FF2B5EF4-FFF2-40B4-BE49-F238E27FC236}">
-                <a16:creationId xmlns:a16="http://schemas.microsoft.com/office/drawing/2014/main" xmlns="" id="{590AD362-84BB-49C7-8C91-CDB895729924}"/>
+                <a16:creationId xmlns="" xmlns:a16="http://schemas.microsoft.com/office/drawing/2014/main" id="{590AD362-84BB-49C7-8C91-CDB895729924}"/>
               </a:ext>
             </a:extLst>
           </p:cNvPr>
@@ -10411,7 +10411,7 @@
             <p:cNvPr id="13" name="Oval 12">
               <a:extLst>
                 <a:ext uri="{FF2B5EF4-FFF2-40B4-BE49-F238E27FC236}">
-                  <a16:creationId xmlns:a16="http://schemas.microsoft.com/office/drawing/2014/main" xmlns="" id="{A32FB427-F316-4459-B06D-2A2B27FC7053}"/>
+                  <a16:creationId xmlns="" xmlns:a16="http://schemas.microsoft.com/office/drawing/2014/main" id="{A32FB427-F316-4459-B06D-2A2B27FC7053}"/>
                 </a:ext>
               </a:extLst>
             </p:cNvPr>
@@ -10465,7 +10465,7 @@
             <p:cNvPr id="14" name="Oval 13">
               <a:extLst>
                 <a:ext uri="{FF2B5EF4-FFF2-40B4-BE49-F238E27FC236}">
-                  <a16:creationId xmlns:a16="http://schemas.microsoft.com/office/drawing/2014/main" xmlns="" id="{C35EF795-8B2D-4CD0-87FF-5756B089D921}"/>
+                  <a16:creationId xmlns="" xmlns:a16="http://schemas.microsoft.com/office/drawing/2014/main" id="{C35EF795-8B2D-4CD0-87FF-5756B089D921}"/>
                 </a:ext>
               </a:extLst>
             </p:cNvPr>
@@ -10518,7 +10518,7 @@
           <p:cNvPr id="15" name="TextBox 14">
             <a:extLst>
               <a:ext uri="{FF2B5EF4-FFF2-40B4-BE49-F238E27FC236}">
-                <a16:creationId xmlns:a16="http://schemas.microsoft.com/office/drawing/2014/main" xmlns="" id="{895C2AE9-E6EE-4572-8B9B-0A1C8899D6FE}"/>
+                <a16:creationId xmlns="" xmlns:a16="http://schemas.microsoft.com/office/drawing/2014/main" id="{895C2AE9-E6EE-4572-8B9B-0A1C8899D6FE}"/>
               </a:ext>
             </a:extLst>
           </p:cNvPr>
@@ -10559,7 +10559,7 @@
           <p:cNvPr id="16" name="TextBox 15">
             <a:extLst>
               <a:ext uri="{FF2B5EF4-FFF2-40B4-BE49-F238E27FC236}">
-                <a16:creationId xmlns:a16="http://schemas.microsoft.com/office/drawing/2014/main" xmlns="" id="{70B20FE2-BC47-4EB2-B7EA-CBE6F5B390D3}"/>
+                <a16:creationId xmlns="" xmlns:a16="http://schemas.microsoft.com/office/drawing/2014/main" id="{70B20FE2-BC47-4EB2-B7EA-CBE6F5B390D3}"/>
               </a:ext>
             </a:extLst>
           </p:cNvPr>
@@ -10600,7 +10600,7 @@
           <p:cNvPr id="17" name="TextBox 16">
             <a:extLst>
               <a:ext uri="{FF2B5EF4-FFF2-40B4-BE49-F238E27FC236}">
-                <a16:creationId xmlns:a16="http://schemas.microsoft.com/office/drawing/2014/main" xmlns="" id="{5FF83314-6443-4064-B8AD-715FDF38C0B1}"/>
+                <a16:creationId xmlns="" xmlns:a16="http://schemas.microsoft.com/office/drawing/2014/main" id="{5FF83314-6443-4064-B8AD-715FDF38C0B1}"/>
               </a:ext>
             </a:extLst>
           </p:cNvPr>
@@ -10641,7 +10641,7 @@
           <p:cNvPr id="18" name="TextBox 17">
             <a:extLst>
               <a:ext uri="{FF2B5EF4-FFF2-40B4-BE49-F238E27FC236}">
-                <a16:creationId xmlns:a16="http://schemas.microsoft.com/office/drawing/2014/main" xmlns="" id="{B58D17C2-3595-44AD-9D77-27C29A8030BC}"/>
+                <a16:creationId xmlns="" xmlns:a16="http://schemas.microsoft.com/office/drawing/2014/main" id="{B58D17C2-3595-44AD-9D77-27C29A8030BC}"/>
               </a:ext>
             </a:extLst>
           </p:cNvPr>
@@ -10682,7 +10682,7 @@
           <p:cNvPr id="19" name="TextBox 18">
             <a:extLst>
               <a:ext uri="{FF2B5EF4-FFF2-40B4-BE49-F238E27FC236}">
-                <a16:creationId xmlns:a16="http://schemas.microsoft.com/office/drawing/2014/main" xmlns="" id="{572131EC-94E6-4982-85F7-903D6FA72171}"/>
+                <a16:creationId xmlns="" xmlns:a16="http://schemas.microsoft.com/office/drawing/2014/main" id="{572131EC-94E6-4982-85F7-903D6FA72171}"/>
               </a:ext>
             </a:extLst>
           </p:cNvPr>
@@ -10723,7 +10723,7 @@
           <p:cNvPr id="20" name="TextBox 19">
             <a:extLst>
               <a:ext uri="{FF2B5EF4-FFF2-40B4-BE49-F238E27FC236}">
-                <a16:creationId xmlns:a16="http://schemas.microsoft.com/office/drawing/2014/main" xmlns="" id="{D8562F22-E78F-4DD5-9BBD-EEAB69C0B365}"/>
+                <a16:creationId xmlns="" xmlns:a16="http://schemas.microsoft.com/office/drawing/2014/main" id="{D8562F22-E78F-4DD5-9BBD-EEAB69C0B365}"/>
               </a:ext>
             </a:extLst>
           </p:cNvPr>
@@ -10764,7 +10764,7 @@
           <p:cNvPr id="21" name="Group 20">
             <a:extLst>
               <a:ext uri="{FF2B5EF4-FFF2-40B4-BE49-F238E27FC236}">
-                <a16:creationId xmlns:a16="http://schemas.microsoft.com/office/drawing/2014/main" xmlns="" id="{711450F4-A7BD-494E-BD71-C6C5EB8D03D1}"/>
+                <a16:creationId xmlns="" xmlns:a16="http://schemas.microsoft.com/office/drawing/2014/main" id="{711450F4-A7BD-494E-BD71-C6C5EB8D03D1}"/>
               </a:ext>
             </a:extLst>
           </p:cNvPr>
@@ -10784,7 +10784,7 @@
             <p:cNvPr id="22" name="Teardrop 21">
               <a:extLst>
                 <a:ext uri="{FF2B5EF4-FFF2-40B4-BE49-F238E27FC236}">
-                  <a16:creationId xmlns:a16="http://schemas.microsoft.com/office/drawing/2014/main" xmlns="" id="{5E489B47-B2BB-4EFB-8EC4-21C10615E463}"/>
+                  <a16:creationId xmlns="" xmlns:a16="http://schemas.microsoft.com/office/drawing/2014/main" id="{5E489B47-B2BB-4EFB-8EC4-21C10615E463}"/>
                 </a:ext>
               </a:extLst>
             </p:cNvPr>
@@ -10838,7 +10838,7 @@
             <p:cNvPr id="23" name="Oval 22">
               <a:extLst>
                 <a:ext uri="{FF2B5EF4-FFF2-40B4-BE49-F238E27FC236}">
-                  <a16:creationId xmlns:a16="http://schemas.microsoft.com/office/drawing/2014/main" xmlns="" id="{862B435C-D1B2-4C1C-B995-8D888E87C5D7}"/>
+                  <a16:creationId xmlns="" xmlns:a16="http://schemas.microsoft.com/office/drawing/2014/main" id="{862B435C-D1B2-4C1C-B995-8D888E87C5D7}"/>
                 </a:ext>
               </a:extLst>
             </p:cNvPr>
@@ -10891,7 +10891,7 @@
           <p:cNvPr id="24" name="Group 23">
             <a:extLst>
               <a:ext uri="{FF2B5EF4-FFF2-40B4-BE49-F238E27FC236}">
-                <a16:creationId xmlns:a16="http://schemas.microsoft.com/office/drawing/2014/main" xmlns="" id="{191C1607-C8B7-4B99-9DC5-3321A9E92D49}"/>
+                <a16:creationId xmlns="" xmlns:a16="http://schemas.microsoft.com/office/drawing/2014/main" id="{191C1607-C8B7-4B99-9DC5-3321A9E92D49}"/>
               </a:ext>
             </a:extLst>
           </p:cNvPr>
@@ -10911,7 +10911,7 @@
             <p:cNvPr id="25" name="Teardrop 24">
               <a:extLst>
                 <a:ext uri="{FF2B5EF4-FFF2-40B4-BE49-F238E27FC236}">
-                  <a16:creationId xmlns:a16="http://schemas.microsoft.com/office/drawing/2014/main" xmlns="" id="{A44D7BEA-70F0-4773-A72C-A5B9951D3536}"/>
+                  <a16:creationId xmlns="" xmlns:a16="http://schemas.microsoft.com/office/drawing/2014/main" id="{A44D7BEA-70F0-4773-A72C-A5B9951D3536}"/>
                 </a:ext>
               </a:extLst>
             </p:cNvPr>
@@ -10965,7 +10965,7 @@
             <p:cNvPr id="26" name="Oval 25">
               <a:extLst>
                 <a:ext uri="{FF2B5EF4-FFF2-40B4-BE49-F238E27FC236}">
-                  <a16:creationId xmlns:a16="http://schemas.microsoft.com/office/drawing/2014/main" xmlns="" id="{1431DABB-47B8-4640-BD39-9CC7E2CDA115}"/>
+                  <a16:creationId xmlns="" xmlns:a16="http://schemas.microsoft.com/office/drawing/2014/main" id="{1431DABB-47B8-4640-BD39-9CC7E2CDA115}"/>
                 </a:ext>
               </a:extLst>
             </p:cNvPr>
@@ -11018,7 +11018,7 @@
           <p:cNvPr id="27" name="Group 26">
             <a:extLst>
               <a:ext uri="{FF2B5EF4-FFF2-40B4-BE49-F238E27FC236}">
-                <a16:creationId xmlns:a16="http://schemas.microsoft.com/office/drawing/2014/main" xmlns="" id="{FA807BE1-996E-4364-AC05-CAC8C826377C}"/>
+                <a16:creationId xmlns="" xmlns:a16="http://schemas.microsoft.com/office/drawing/2014/main" id="{FA807BE1-996E-4364-AC05-CAC8C826377C}"/>
               </a:ext>
             </a:extLst>
           </p:cNvPr>
@@ -11038,7 +11038,7 @@
             <p:cNvPr id="28" name="Teardrop 27">
               <a:extLst>
                 <a:ext uri="{FF2B5EF4-FFF2-40B4-BE49-F238E27FC236}">
-                  <a16:creationId xmlns:a16="http://schemas.microsoft.com/office/drawing/2014/main" xmlns="" id="{76257F1B-992C-4717-A6A2-EDE25A4F31C3}"/>
+                  <a16:creationId xmlns="" xmlns:a16="http://schemas.microsoft.com/office/drawing/2014/main" id="{76257F1B-992C-4717-A6A2-EDE25A4F31C3}"/>
                 </a:ext>
               </a:extLst>
             </p:cNvPr>
@@ -11092,7 +11092,7 @@
             <p:cNvPr id="29" name="Oval 28">
               <a:extLst>
                 <a:ext uri="{FF2B5EF4-FFF2-40B4-BE49-F238E27FC236}">
-                  <a16:creationId xmlns:a16="http://schemas.microsoft.com/office/drawing/2014/main" xmlns="" id="{CBB174F9-BA66-486F-BC62-F2720CED100C}"/>
+                  <a16:creationId xmlns="" xmlns:a16="http://schemas.microsoft.com/office/drawing/2014/main" id="{CBB174F9-BA66-486F-BC62-F2720CED100C}"/>
                 </a:ext>
               </a:extLst>
             </p:cNvPr>
@@ -11145,7 +11145,7 @@
           <p:cNvPr id="30" name="Straight Connector 29">
             <a:extLst>
               <a:ext uri="{FF2B5EF4-FFF2-40B4-BE49-F238E27FC236}">
-                <a16:creationId xmlns:a16="http://schemas.microsoft.com/office/drawing/2014/main" xmlns="" id="{D5DAD85F-381F-4EA0-9781-3C23F8D9AC73}"/>
+                <a16:creationId xmlns="" xmlns:a16="http://schemas.microsoft.com/office/drawing/2014/main" id="{D5DAD85F-381F-4EA0-9781-3C23F8D9AC73}"/>
               </a:ext>
             </a:extLst>
           </p:cNvPr>
@@ -11188,7 +11188,7 @@
           <p:cNvPr id="31" name="Group 30">
             <a:extLst>
               <a:ext uri="{FF2B5EF4-FFF2-40B4-BE49-F238E27FC236}">
-                <a16:creationId xmlns:a16="http://schemas.microsoft.com/office/drawing/2014/main" xmlns="" id="{F1840EDE-DF70-433F-86FE-A402BC5C2DDE}"/>
+                <a16:creationId xmlns="" xmlns:a16="http://schemas.microsoft.com/office/drawing/2014/main" id="{F1840EDE-DF70-433F-86FE-A402BC5C2DDE}"/>
               </a:ext>
             </a:extLst>
           </p:cNvPr>
@@ -11208,7 +11208,7 @@
             <p:cNvPr id="32" name="Oval 31">
               <a:extLst>
                 <a:ext uri="{FF2B5EF4-FFF2-40B4-BE49-F238E27FC236}">
-                  <a16:creationId xmlns:a16="http://schemas.microsoft.com/office/drawing/2014/main" xmlns="" id="{43B84625-CD81-4477-AFEA-2D657FFA16C5}"/>
+                  <a16:creationId xmlns="" xmlns:a16="http://schemas.microsoft.com/office/drawing/2014/main" id="{43B84625-CD81-4477-AFEA-2D657FFA16C5}"/>
                 </a:ext>
               </a:extLst>
             </p:cNvPr>
@@ -11262,7 +11262,7 @@
             <p:cNvPr id="33" name="Oval 32">
               <a:extLst>
                 <a:ext uri="{FF2B5EF4-FFF2-40B4-BE49-F238E27FC236}">
-                  <a16:creationId xmlns:a16="http://schemas.microsoft.com/office/drawing/2014/main" xmlns="" id="{90BB5737-FB23-4CC2-81BC-52D57E7FB8E9}"/>
+                  <a16:creationId xmlns="" xmlns:a16="http://schemas.microsoft.com/office/drawing/2014/main" id="{90BB5737-FB23-4CC2-81BC-52D57E7FB8E9}"/>
                 </a:ext>
               </a:extLst>
             </p:cNvPr>
@@ -11317,7 +11317,7 @@
           <p:cNvPr id="34" name="TextBox 33">
             <a:extLst>
               <a:ext uri="{FF2B5EF4-FFF2-40B4-BE49-F238E27FC236}">
-                <a16:creationId xmlns:a16="http://schemas.microsoft.com/office/drawing/2014/main" xmlns="" id="{895C2AE9-E6EE-4572-8B9B-0A1C8899D6FE}"/>
+                <a16:creationId xmlns="" xmlns:a16="http://schemas.microsoft.com/office/drawing/2014/main" id="{895C2AE9-E6EE-4572-8B9B-0A1C8899D6FE}"/>
               </a:ext>
             </a:extLst>
           </p:cNvPr>
@@ -11358,7 +11358,7 @@
           <p:cNvPr id="35" name="TextBox 34">
             <a:extLst>
               <a:ext uri="{FF2B5EF4-FFF2-40B4-BE49-F238E27FC236}">
-                <a16:creationId xmlns:a16="http://schemas.microsoft.com/office/drawing/2014/main" xmlns="" id="{70B20FE2-BC47-4EB2-B7EA-CBE6F5B390D3}"/>
+                <a16:creationId xmlns="" xmlns:a16="http://schemas.microsoft.com/office/drawing/2014/main" id="{70B20FE2-BC47-4EB2-B7EA-CBE6F5B390D3}"/>
               </a:ext>
             </a:extLst>
           </p:cNvPr>
@@ -11401,7 +11401,7 @@
           <p:cNvPr id="36" name="Group 35">
             <a:extLst>
               <a:ext uri="{FF2B5EF4-FFF2-40B4-BE49-F238E27FC236}">
-                <a16:creationId xmlns:a16="http://schemas.microsoft.com/office/drawing/2014/main" xmlns="" id="{711450F4-A7BD-494E-BD71-C6C5EB8D03D1}"/>
+                <a16:creationId xmlns="" xmlns:a16="http://schemas.microsoft.com/office/drawing/2014/main" id="{711450F4-A7BD-494E-BD71-C6C5EB8D03D1}"/>
               </a:ext>
             </a:extLst>
           </p:cNvPr>
@@ -11421,7 +11421,7 @@
             <p:cNvPr id="37" name="Teardrop 36">
               <a:extLst>
                 <a:ext uri="{FF2B5EF4-FFF2-40B4-BE49-F238E27FC236}">
-                  <a16:creationId xmlns:a16="http://schemas.microsoft.com/office/drawing/2014/main" xmlns="" id="{5E489B47-B2BB-4EFB-8EC4-21C10615E463}"/>
+                  <a16:creationId xmlns="" xmlns:a16="http://schemas.microsoft.com/office/drawing/2014/main" id="{5E489B47-B2BB-4EFB-8EC4-21C10615E463}"/>
                 </a:ext>
               </a:extLst>
             </p:cNvPr>
@@ -11481,7 +11481,7 @@
             <p:cNvPr id="38" name="Oval 37">
               <a:extLst>
                 <a:ext uri="{FF2B5EF4-FFF2-40B4-BE49-F238E27FC236}">
-                  <a16:creationId xmlns:a16="http://schemas.microsoft.com/office/drawing/2014/main" xmlns="" id="{862B435C-D1B2-4C1C-B995-8D888E87C5D7}"/>
+                  <a16:creationId xmlns="" xmlns:a16="http://schemas.microsoft.com/office/drawing/2014/main" id="{862B435C-D1B2-4C1C-B995-8D888E87C5D7}"/>
                 </a:ext>
               </a:extLst>
             </p:cNvPr>
@@ -11538,7 +11538,7 @@
           <p:cNvPr id="39" name="Group 38">
             <a:extLst>
               <a:ext uri="{FF2B5EF4-FFF2-40B4-BE49-F238E27FC236}">
-                <a16:creationId xmlns:a16="http://schemas.microsoft.com/office/drawing/2014/main" xmlns="" id="{F1840EDE-DF70-433F-86FE-A402BC5C2DDE}"/>
+                <a16:creationId xmlns="" xmlns:a16="http://schemas.microsoft.com/office/drawing/2014/main" id="{F1840EDE-DF70-433F-86FE-A402BC5C2DDE}"/>
               </a:ext>
             </a:extLst>
           </p:cNvPr>
@@ -11558,7 +11558,7 @@
             <p:cNvPr id="40" name="Oval 39">
               <a:extLst>
                 <a:ext uri="{FF2B5EF4-FFF2-40B4-BE49-F238E27FC236}">
-                  <a16:creationId xmlns:a16="http://schemas.microsoft.com/office/drawing/2014/main" xmlns="" id="{43B84625-CD81-4477-AFEA-2D657FFA16C5}"/>
+                  <a16:creationId xmlns="" xmlns:a16="http://schemas.microsoft.com/office/drawing/2014/main" id="{43B84625-CD81-4477-AFEA-2D657FFA16C5}"/>
                 </a:ext>
               </a:extLst>
             </p:cNvPr>
@@ -11612,7 +11612,7 @@
             <p:cNvPr id="41" name="Oval 40">
               <a:extLst>
                 <a:ext uri="{FF2B5EF4-FFF2-40B4-BE49-F238E27FC236}">
-                  <a16:creationId xmlns:a16="http://schemas.microsoft.com/office/drawing/2014/main" xmlns="" id="{90BB5737-FB23-4CC2-81BC-52D57E7FB8E9}"/>
+                  <a16:creationId xmlns="" xmlns:a16="http://schemas.microsoft.com/office/drawing/2014/main" id="{90BB5737-FB23-4CC2-81BC-52D57E7FB8E9}"/>
                 </a:ext>
               </a:extLst>
             </p:cNvPr>
@@ -11667,7 +11667,7 @@
           <p:cNvPr id="42" name="TextBox 41">
             <a:extLst>
               <a:ext uri="{FF2B5EF4-FFF2-40B4-BE49-F238E27FC236}">
-                <a16:creationId xmlns:a16="http://schemas.microsoft.com/office/drawing/2014/main" xmlns="" id="{895C2AE9-E6EE-4572-8B9B-0A1C8899D6FE}"/>
+                <a16:creationId xmlns="" xmlns:a16="http://schemas.microsoft.com/office/drawing/2014/main" id="{895C2AE9-E6EE-4572-8B9B-0A1C8899D6FE}"/>
               </a:ext>
             </a:extLst>
           </p:cNvPr>
@@ -11708,7 +11708,7 @@
           <p:cNvPr id="43" name="TextBox 42">
             <a:extLst>
               <a:ext uri="{FF2B5EF4-FFF2-40B4-BE49-F238E27FC236}">
-                <a16:creationId xmlns:a16="http://schemas.microsoft.com/office/drawing/2014/main" xmlns="" id="{70B20FE2-BC47-4EB2-B7EA-CBE6F5B390D3}"/>
+                <a16:creationId xmlns="" xmlns:a16="http://schemas.microsoft.com/office/drawing/2014/main" id="{70B20FE2-BC47-4EB2-B7EA-CBE6F5B390D3}"/>
               </a:ext>
             </a:extLst>
           </p:cNvPr>
@@ -11751,7 +11751,7 @@
           <p:cNvPr id="44" name="Group 43">
             <a:extLst>
               <a:ext uri="{FF2B5EF4-FFF2-40B4-BE49-F238E27FC236}">
-                <a16:creationId xmlns:a16="http://schemas.microsoft.com/office/drawing/2014/main" xmlns="" id="{711450F4-A7BD-494E-BD71-C6C5EB8D03D1}"/>
+                <a16:creationId xmlns="" xmlns:a16="http://schemas.microsoft.com/office/drawing/2014/main" id="{711450F4-A7BD-494E-BD71-C6C5EB8D03D1}"/>
               </a:ext>
             </a:extLst>
           </p:cNvPr>
@@ -11771,7 +11771,7 @@
             <p:cNvPr id="45" name="Teardrop 44">
               <a:extLst>
                 <a:ext uri="{FF2B5EF4-FFF2-40B4-BE49-F238E27FC236}">
-                  <a16:creationId xmlns:a16="http://schemas.microsoft.com/office/drawing/2014/main" xmlns="" id="{5E489B47-B2BB-4EFB-8EC4-21C10615E463}"/>
+                  <a16:creationId xmlns="" xmlns:a16="http://schemas.microsoft.com/office/drawing/2014/main" id="{5E489B47-B2BB-4EFB-8EC4-21C10615E463}"/>
                 </a:ext>
               </a:extLst>
             </p:cNvPr>
@@ -11831,7 +11831,7 @@
             <p:cNvPr id="46" name="Oval 45">
               <a:extLst>
                 <a:ext uri="{FF2B5EF4-FFF2-40B4-BE49-F238E27FC236}">
-                  <a16:creationId xmlns:a16="http://schemas.microsoft.com/office/drawing/2014/main" xmlns="" id="{862B435C-D1B2-4C1C-B995-8D888E87C5D7}"/>
+                  <a16:creationId xmlns="" xmlns:a16="http://schemas.microsoft.com/office/drawing/2014/main" id="{862B435C-D1B2-4C1C-B995-8D888E87C5D7}"/>
                 </a:ext>
               </a:extLst>
             </p:cNvPr>
@@ -11888,7 +11888,7 @@
           <p:cNvPr id="47" name="Straight Connector 46">
             <a:extLst>
               <a:ext uri="{FF2B5EF4-FFF2-40B4-BE49-F238E27FC236}">
-                <a16:creationId xmlns:a16="http://schemas.microsoft.com/office/drawing/2014/main" xmlns="" id="{D5DAD85F-381F-4EA0-9781-3C23F8D9AC73}"/>
+                <a16:creationId xmlns="" xmlns:a16="http://schemas.microsoft.com/office/drawing/2014/main" id="{D5DAD85F-381F-4EA0-9781-3C23F8D9AC73}"/>
               </a:ext>
             </a:extLst>
           </p:cNvPr>
@@ -11931,7 +11931,7 @@
           <p:cNvPr id="48" name="TextBox 47">
             <a:extLst>
               <a:ext uri="{FF2B5EF4-FFF2-40B4-BE49-F238E27FC236}">
-                <a16:creationId xmlns:a16="http://schemas.microsoft.com/office/drawing/2014/main" xmlns="" id="{A94C4F95-2EDE-46B0-8B26-C72D6D3C8DB3}"/>
+                <a16:creationId xmlns="" xmlns:a16="http://schemas.microsoft.com/office/drawing/2014/main" id="{A94C4F95-2EDE-46B0-8B26-C72D6D3C8DB3}"/>
               </a:ext>
             </a:extLst>
           </p:cNvPr>
@@ -11972,7 +11972,7 @@
           <p:cNvPr id="49" name="TextBox 48">
             <a:extLst>
               <a:ext uri="{FF2B5EF4-FFF2-40B4-BE49-F238E27FC236}">
-                <a16:creationId xmlns:a16="http://schemas.microsoft.com/office/drawing/2014/main" xmlns="" id="{D8562F22-E78F-4DD5-9BBD-EEAB69C0B365}"/>
+                <a16:creationId xmlns="" xmlns:a16="http://schemas.microsoft.com/office/drawing/2014/main" id="{D8562F22-E78F-4DD5-9BBD-EEAB69C0B365}"/>
               </a:ext>
             </a:extLst>
           </p:cNvPr>
@@ -14238,7 +14238,7 @@
           <p:cNvPr id="7" name="TextBox 6">
             <a:extLst>
               <a:ext uri="{FF2B5EF4-FFF2-40B4-BE49-F238E27FC236}">
-                <a16:creationId xmlns:a16="http://schemas.microsoft.com/office/drawing/2014/main" xmlns="" id="{A94C4F95-2EDE-46B0-8B26-C72D6D3C8DB3}"/>
+                <a16:creationId xmlns="" xmlns:a16="http://schemas.microsoft.com/office/drawing/2014/main" id="{A94C4F95-2EDE-46B0-8B26-C72D6D3C8DB3}"/>
               </a:ext>
             </a:extLst>
           </p:cNvPr>
@@ -14279,7 +14279,7 @@
           <p:cNvPr id="8" name="TextBox 7">
             <a:extLst>
               <a:ext uri="{FF2B5EF4-FFF2-40B4-BE49-F238E27FC236}">
-                <a16:creationId xmlns:a16="http://schemas.microsoft.com/office/drawing/2014/main" xmlns="" id="{D8562F22-E78F-4DD5-9BBD-EEAB69C0B365}"/>
+                <a16:creationId xmlns="" xmlns:a16="http://schemas.microsoft.com/office/drawing/2014/main" id="{D8562F22-E78F-4DD5-9BBD-EEAB69C0B365}"/>
               </a:ext>
             </a:extLst>
           </p:cNvPr>
@@ -14395,7 +14395,7 @@
           <p:cNvPr id="4" name="TextBox 3">
             <a:extLst>
               <a:ext uri="{FF2B5EF4-FFF2-40B4-BE49-F238E27FC236}">
-                <a16:creationId xmlns:a16="http://schemas.microsoft.com/office/drawing/2014/main" xmlns="" id="{D8562F22-E78F-4DD5-9BBD-EEAB69C0B365}"/>
+                <a16:creationId xmlns="" xmlns:a16="http://schemas.microsoft.com/office/drawing/2014/main" id="{D8562F22-E78F-4DD5-9BBD-EEAB69C0B365}"/>
               </a:ext>
             </a:extLst>
           </p:cNvPr>
@@ -14545,7 +14545,7 @@
           <p:cNvPr id="5" name="TextBox 4">
             <a:extLst>
               <a:ext uri="{FF2B5EF4-FFF2-40B4-BE49-F238E27FC236}">
-                <a16:creationId xmlns:a16="http://schemas.microsoft.com/office/drawing/2014/main" xmlns="" id="{D8562F22-E78F-4DD5-9BBD-EEAB69C0B365}"/>
+                <a16:creationId xmlns="" xmlns:a16="http://schemas.microsoft.com/office/drawing/2014/main" id="{D8562F22-E78F-4DD5-9BBD-EEAB69C0B365}"/>
               </a:ext>
             </a:extLst>
           </p:cNvPr>
@@ -14996,7 +14996,7 @@
           <p:cNvPr id="5" name="TextBox 4">
             <a:extLst>
               <a:ext uri="{FF2B5EF4-FFF2-40B4-BE49-F238E27FC236}">
-                <a16:creationId xmlns:a16="http://schemas.microsoft.com/office/drawing/2014/main" xmlns="" id="{A94C4F95-2EDE-46B0-8B26-C72D6D3C8DB3}"/>
+                <a16:creationId xmlns="" xmlns:a16="http://schemas.microsoft.com/office/drawing/2014/main" id="{A94C4F95-2EDE-46B0-8B26-C72D6D3C8DB3}"/>
               </a:ext>
             </a:extLst>
           </p:cNvPr>
@@ -15037,7 +15037,7 @@
           <p:cNvPr id="6" name="TextBox 5">
             <a:extLst>
               <a:ext uri="{FF2B5EF4-FFF2-40B4-BE49-F238E27FC236}">
-                <a16:creationId xmlns:a16="http://schemas.microsoft.com/office/drawing/2014/main" xmlns="" id="{D8562F22-E78F-4DD5-9BBD-EEAB69C0B365}"/>
+                <a16:creationId xmlns="" xmlns:a16="http://schemas.microsoft.com/office/drawing/2014/main" id="{D8562F22-E78F-4DD5-9BBD-EEAB69C0B365}"/>
               </a:ext>
             </a:extLst>
           </p:cNvPr>
@@ -15107,7 +15107,7 @@
           <p:cNvPr id="8" name="TextBox 7">
             <a:extLst>
               <a:ext uri="{FF2B5EF4-FFF2-40B4-BE49-F238E27FC236}">
-                <a16:creationId xmlns:a16="http://schemas.microsoft.com/office/drawing/2014/main" xmlns="" id="{D8562F22-E78F-4DD5-9BBD-EEAB69C0B365}"/>
+                <a16:creationId xmlns="" xmlns:a16="http://schemas.microsoft.com/office/drawing/2014/main" id="{D8562F22-E78F-4DD5-9BBD-EEAB69C0B365}"/>
               </a:ext>
             </a:extLst>
           </p:cNvPr>
@@ -15582,7 +15582,7 @@
           <p:cNvPr id="4" name="TextBox 3">
             <a:extLst>
               <a:ext uri="{FF2B5EF4-FFF2-40B4-BE49-F238E27FC236}">
-                <a16:creationId xmlns:a16="http://schemas.microsoft.com/office/drawing/2014/main" xmlns="" id="{A94C4F95-2EDE-46B0-8B26-C72D6D3C8DB3}"/>
+                <a16:creationId xmlns="" xmlns:a16="http://schemas.microsoft.com/office/drawing/2014/main" id="{A94C4F95-2EDE-46B0-8B26-C72D6D3C8DB3}"/>
               </a:ext>
             </a:extLst>
           </p:cNvPr>
@@ -15623,7 +15623,7 @@
           <p:cNvPr id="5" name="TextBox 4">
             <a:extLst>
               <a:ext uri="{FF2B5EF4-FFF2-40B4-BE49-F238E27FC236}">
-                <a16:creationId xmlns:a16="http://schemas.microsoft.com/office/drawing/2014/main" xmlns="" id="{D8562F22-E78F-4DD5-9BBD-EEAB69C0B365}"/>
+                <a16:creationId xmlns="" xmlns:a16="http://schemas.microsoft.com/office/drawing/2014/main" id="{D8562F22-E78F-4DD5-9BBD-EEAB69C0B365}"/>
               </a:ext>
             </a:extLst>
           </p:cNvPr>
@@ -15812,7 +15812,7 @@
           <p:cNvPr id="6" name="TextBox 5">
             <a:extLst>
               <a:ext uri="{FF2B5EF4-FFF2-40B4-BE49-F238E27FC236}">
-                <a16:creationId xmlns:a16="http://schemas.microsoft.com/office/drawing/2014/main" xmlns="" id="{D8562F22-E78F-4DD5-9BBD-EEAB69C0B365}"/>
+                <a16:creationId xmlns="" xmlns:a16="http://schemas.microsoft.com/office/drawing/2014/main" id="{D8562F22-E78F-4DD5-9BBD-EEAB69C0B365}"/>
               </a:ext>
             </a:extLst>
           </p:cNvPr>
@@ -16369,7 +16369,7 @@
           <p:cNvPr id="4" name="TextBox 3">
             <a:extLst>
               <a:ext uri="{FF2B5EF4-FFF2-40B4-BE49-F238E27FC236}">
-                <a16:creationId xmlns:a16="http://schemas.microsoft.com/office/drawing/2014/main" xmlns="" id="{A94C4F95-2EDE-46B0-8B26-C72D6D3C8DB3}"/>
+                <a16:creationId xmlns="" xmlns:a16="http://schemas.microsoft.com/office/drawing/2014/main" id="{A94C4F95-2EDE-46B0-8B26-C72D6D3C8DB3}"/>
               </a:ext>
             </a:extLst>
           </p:cNvPr>
@@ -16410,7 +16410,7 @@
           <p:cNvPr id="7" name="TextBox 6">
             <a:extLst>
               <a:ext uri="{FF2B5EF4-FFF2-40B4-BE49-F238E27FC236}">
-                <a16:creationId xmlns:a16="http://schemas.microsoft.com/office/drawing/2014/main" xmlns="" id="{D8562F22-E78F-4DD5-9BBD-EEAB69C0B365}"/>
+                <a16:creationId xmlns="" xmlns:a16="http://schemas.microsoft.com/office/drawing/2014/main" id="{D8562F22-E78F-4DD5-9BBD-EEAB69C0B365}"/>
               </a:ext>
             </a:extLst>
           </p:cNvPr>
@@ -16567,7 +16567,7 @@
           <p:cNvPr id="5" name="TextBox 4">
             <a:extLst>
               <a:ext uri="{FF2B5EF4-FFF2-40B4-BE49-F238E27FC236}">
-                <a16:creationId xmlns:a16="http://schemas.microsoft.com/office/drawing/2014/main" xmlns="" id="{D8562F22-E78F-4DD5-9BBD-EEAB69C0B365}"/>
+                <a16:creationId xmlns="" xmlns:a16="http://schemas.microsoft.com/office/drawing/2014/main" id="{D8562F22-E78F-4DD5-9BBD-EEAB69C0B365}"/>
               </a:ext>
             </a:extLst>
           </p:cNvPr>
@@ -16961,7 +16961,7 @@
           <p:cNvPr id="4" name="TextBox 3">
             <a:extLst>
               <a:ext uri="{FF2B5EF4-FFF2-40B4-BE49-F238E27FC236}">
-                <a16:creationId xmlns:a16="http://schemas.microsoft.com/office/drawing/2014/main" xmlns="" id="{A94C4F95-2EDE-46B0-8B26-C72D6D3C8DB3}"/>
+                <a16:creationId xmlns="" xmlns:a16="http://schemas.microsoft.com/office/drawing/2014/main" id="{A94C4F95-2EDE-46B0-8B26-C72D6D3C8DB3}"/>
               </a:ext>
             </a:extLst>
           </p:cNvPr>
@@ -17002,7 +17002,7 @@
           <p:cNvPr id="5" name="TextBox 4">
             <a:extLst>
               <a:ext uri="{FF2B5EF4-FFF2-40B4-BE49-F238E27FC236}">
-                <a16:creationId xmlns:a16="http://schemas.microsoft.com/office/drawing/2014/main" xmlns="" id="{D8562F22-E78F-4DD5-9BBD-EEAB69C0B365}"/>
+                <a16:creationId xmlns="" xmlns:a16="http://schemas.microsoft.com/office/drawing/2014/main" id="{D8562F22-E78F-4DD5-9BBD-EEAB69C0B365}"/>
               </a:ext>
             </a:extLst>
           </p:cNvPr>
@@ -17139,7 +17139,7 @@
           <p:cNvPr id="9" name="TextBox 8">
             <a:extLst>
               <a:ext uri="{FF2B5EF4-FFF2-40B4-BE49-F238E27FC236}">
-                <a16:creationId xmlns:a16="http://schemas.microsoft.com/office/drawing/2014/main" xmlns="" id="{D8562F22-E78F-4DD5-9BBD-EEAB69C0B365}"/>
+                <a16:creationId xmlns="" xmlns:a16="http://schemas.microsoft.com/office/drawing/2014/main" id="{D8562F22-E78F-4DD5-9BBD-EEAB69C0B365}"/>
               </a:ext>
             </a:extLst>
           </p:cNvPr>
@@ -17180,7 +17180,7 @@
           <p:cNvPr id="11" name="TextBox 10">
             <a:extLst>
               <a:ext uri="{FF2B5EF4-FFF2-40B4-BE49-F238E27FC236}">
-                <a16:creationId xmlns:a16="http://schemas.microsoft.com/office/drawing/2014/main" xmlns="" id="{D8562F22-E78F-4DD5-9BBD-EEAB69C0B365}"/>
+                <a16:creationId xmlns="" xmlns:a16="http://schemas.microsoft.com/office/drawing/2014/main" id="{D8562F22-E78F-4DD5-9BBD-EEAB69C0B365}"/>
               </a:ext>
             </a:extLst>
           </p:cNvPr>
@@ -17227,7 +17227,7 @@
           <p:cNvPr id="8" name="TextBox 7">
             <a:extLst>
               <a:ext uri="{FF2B5EF4-FFF2-40B4-BE49-F238E27FC236}">
-                <a16:creationId xmlns:a16="http://schemas.microsoft.com/office/drawing/2014/main" xmlns="" id="{D8562F22-E78F-4DD5-9BBD-EEAB69C0B365}"/>
+                <a16:creationId xmlns="" xmlns:a16="http://schemas.microsoft.com/office/drawing/2014/main" id="{D8562F22-E78F-4DD5-9BBD-EEAB69C0B365}"/>
               </a:ext>
             </a:extLst>
           </p:cNvPr>
@@ -17947,7 +17947,7 @@
           <p:cNvPr id="4" name="TextBox 3">
             <a:extLst>
               <a:ext uri="{FF2B5EF4-FFF2-40B4-BE49-F238E27FC236}">
-                <a16:creationId xmlns:a16="http://schemas.microsoft.com/office/drawing/2014/main" xmlns="" id="{A94C4F95-2EDE-46B0-8B26-C72D6D3C8DB3}"/>
+                <a16:creationId xmlns="" xmlns:a16="http://schemas.microsoft.com/office/drawing/2014/main" id="{A94C4F95-2EDE-46B0-8B26-C72D6D3C8DB3}"/>
               </a:ext>
             </a:extLst>
           </p:cNvPr>
@@ -17988,7 +17988,7 @@
           <p:cNvPr id="5" name="TextBox 4">
             <a:extLst>
               <a:ext uri="{FF2B5EF4-FFF2-40B4-BE49-F238E27FC236}">
-                <a16:creationId xmlns:a16="http://schemas.microsoft.com/office/drawing/2014/main" xmlns="" id="{D8562F22-E78F-4DD5-9BBD-EEAB69C0B365}"/>
+                <a16:creationId xmlns="" xmlns:a16="http://schemas.microsoft.com/office/drawing/2014/main" id="{D8562F22-E78F-4DD5-9BBD-EEAB69C0B365}"/>
               </a:ext>
             </a:extLst>
           </p:cNvPr>
@@ -18081,7 +18081,7 @@
           <p:cNvPr id="9" name="TextBox 8">
             <a:extLst>
               <a:ext uri="{FF2B5EF4-FFF2-40B4-BE49-F238E27FC236}">
-                <a16:creationId xmlns:a16="http://schemas.microsoft.com/office/drawing/2014/main" xmlns="" id="{D8562F22-E78F-4DD5-9BBD-EEAB69C0B365}"/>
+                <a16:creationId xmlns="" xmlns:a16="http://schemas.microsoft.com/office/drawing/2014/main" id="{D8562F22-E78F-4DD5-9BBD-EEAB69C0B365}"/>
               </a:ext>
             </a:extLst>
           </p:cNvPr>
@@ -18122,7 +18122,7 @@
           <p:cNvPr id="6" name="TextBox 5">
             <a:extLst>
               <a:ext uri="{FF2B5EF4-FFF2-40B4-BE49-F238E27FC236}">
-                <a16:creationId xmlns:a16="http://schemas.microsoft.com/office/drawing/2014/main" xmlns="" id="{D8562F22-E78F-4DD5-9BBD-EEAB69C0B365}"/>
+                <a16:creationId xmlns="" xmlns:a16="http://schemas.microsoft.com/office/drawing/2014/main" id="{D8562F22-E78F-4DD5-9BBD-EEAB69C0B365}"/>
               </a:ext>
             </a:extLst>
           </p:cNvPr>
@@ -18679,7 +18679,7 @@
           <p:cNvPr id="6" name="Content Placeholder 5">
             <a:extLst>
               <a:ext uri="{FF2B5EF4-FFF2-40B4-BE49-F238E27FC236}">
-                <a16:creationId xmlns:a16="http://schemas.microsoft.com/office/drawing/2014/main" xmlns="" id="{6BFC7565-EB43-495C-BD2F-B281B399914F}"/>
+                <a16:creationId xmlns="" xmlns:a16="http://schemas.microsoft.com/office/drawing/2014/main" id="{6BFC7565-EB43-495C-BD2F-B281B399914F}"/>
               </a:ext>
             </a:extLst>
           </p:cNvPr>
@@ -18720,12 +18720,6 @@
               </a:rPr>
               <a:t>Development</a:t>
             </a:r>
-            <a:endParaRPr lang="en-US" b="1" dirty="0" smtClean="0">
-              <a:solidFill>
-                <a:srgbClr val="FEC630"/>
-              </a:solidFill>
-              <a:latin typeface="Tw Cen MT" panose="020B0602020104020603" pitchFamily="34" charset="0"/>
-            </a:endParaRPr>
           </a:p>
           <a:p>
             <a:pPr marL="0" indent="0">
@@ -18848,7 +18842,7 @@
           <p:cNvPr id="8" name="TextBox 7">
             <a:extLst>
               <a:ext uri="{FF2B5EF4-FFF2-40B4-BE49-F238E27FC236}">
-                <a16:creationId xmlns:a16="http://schemas.microsoft.com/office/drawing/2014/main" xmlns="" id="{2BCA19A0-ABAB-4E6B-8560-E8630FA4D4E4}"/>
+                <a16:creationId xmlns="" xmlns:a16="http://schemas.microsoft.com/office/drawing/2014/main" id="{2BCA19A0-ABAB-4E6B-8560-E8630FA4D4E4}"/>
               </a:ext>
             </a:extLst>
           </p:cNvPr>
@@ -18889,7 +18883,7 @@
           <p:cNvPr id="10" name="TextBox 9">
             <a:extLst>
               <a:ext uri="{FF2B5EF4-FFF2-40B4-BE49-F238E27FC236}">
-                <a16:creationId xmlns:a16="http://schemas.microsoft.com/office/drawing/2014/main" xmlns="" id="{1D89A033-DE43-4AAC-8846-A5E8AE46F002}"/>
+                <a16:creationId xmlns="" xmlns:a16="http://schemas.microsoft.com/office/drawing/2014/main" id="{1D89A033-DE43-4AAC-8846-A5E8AE46F002}"/>
               </a:ext>
             </a:extLst>
           </p:cNvPr>

</xml_diff>